<commit_message>
updating with speaker notes and additional tougher nut to crack
</commit_message>
<xml_diff>
--- a/docs/Initrode.Hack().pptx
+++ b/docs/Initrode.Hack().pptx
@@ -35,6 +35,7 @@
     <p:sldId id="280" r:id="rId30"/>
     <p:sldId id="281" r:id="rId31"/>
     <p:sldId id="282" r:id="rId32"/>
+    <p:sldId id="283" r:id="rId33"/>
   </p:sldIdLst>
   <p:sldSz cy="5143500" cx="9144000"/>
   <p:notesSz cx="6858000" cy="9144000"/>
@@ -598,7 +599,7 @@
             </a:pPr>
             <a:r>
               <a:rPr lang="en"/>
-              <a:t>So, audience participation time - could this base approach be better?</a:t>
+              <a:t>So, audience participation time - could this base approach be better? Well, the “encrypted binaries” approach offered by the dongle would seem to be pretty solid.</a:t>
             </a:r>
           </a:p>
         </p:txBody>
@@ -703,7 +704,7 @@
             </a:pPr>
             <a:r>
               <a:rPr lang="en"/>
-              <a:t>This is the basic concept - let’s review the various options of what can be applied here to keep the great unwashed out.</a:t>
+              <a:t>This is the basic concept - let’s review the various options of what can be applied here to keep the great unwashed out. Process loads the Engine (A) and the engine asks the Security component (B) for permission</a:t>
             </a:r>
           </a:p>
         </p:txBody>
@@ -808,7 +809,20 @@
             </a:pPr>
             <a:r>
               <a:rPr lang="en"/>
-              <a:t>So we get this - harsh but fair? User experience is perhaps not great when Murphy’s Law visits us</a:t>
+              <a:t>Preventing load looks like this. </a:t>
+            </a:r>
+            <a:r>
+              <a:rPr lang="en" u="sng">
+                <a:solidFill>
+                  <a:schemeClr val="hlink"/>
+                </a:solidFill>
+                <a:hlinkClick r:id="rId2"/>
+              </a:rPr>
+              <a:t>https://www.google.co.uk/?q=0xC0000142</a:t>
+            </a:r>
+            <a:r>
+              <a:rPr lang="en"/>
+              <a:t> So we get this - harsh but fair? User experience is perhaps not great when Murphy’s Law visits us</a:t>
             </a:r>
           </a:p>
         </p:txBody>
@@ -913,7 +927,7 @@
             </a:pPr>
             <a:r>
               <a:rPr lang="en"/>
-              <a:t>Next level - the app and it’s API are linked statically to the security check</a:t>
+              <a:t>Next level - the app and it’s API are linked statically to the security check. Walking back from the lef node - the load order is actually B, A(static), Process</a:t>
             </a:r>
           </a:p>
         </p:txBody>
@@ -1022,7 +1036,7 @@
                   <a:schemeClr val="dk1"/>
                 </a:solidFill>
               </a:rPr>
-              <a:t>Yet next level - the app and it’s API are linked dynamically to the security check</a:t>
+              <a:t>Another approach - the app and it’s API are linked dynamically to the security check. Walking backwards load order is Process, A, B</a:t>
             </a:r>
           </a:p>
         </p:txBody>
@@ -1127,7 +1141,21 @@
             </a:pPr>
             <a:r>
               <a:rPr lang="en"/>
-              <a:t>Even if the API is statically linked - if the app can preload a different module it will use that one. We didn’t want to use this. by the way.</a:t>
+              <a:t>Even if the API is statically linked - if the app can preload a different module it will use that one. The load order is Process, B(replacement), A, B(Replacement) statisfies the B.dll link demand</a:t>
+            </a:r>
+            <a:br>
+              <a:rPr lang="en"/>
+            </a:br>
+            <a:r>
+              <a:rPr lang="en"/>
+              <a:t> We didn’t want to use this. by the way.</a:t>
+            </a:r>
+            <a:br>
+              <a:rPr lang="en"/>
+            </a:br>
+            <a:r>
+              <a:rPr lang="en"/>
+              <a:t>Oh and BTW - the first piece of misinformation was a few slides back - did anyone spot it?</a:t>
             </a:r>
           </a:p>
         </p:txBody>
@@ -1558,7 +1586,7 @@
                   <a:schemeClr val="dk1"/>
                 </a:solidFill>
               </a:rPr>
-              <a:t>Digression needed for GetProcAddress BTW the amount of calls to Get ProcAddress is quite startling on a decent sized app</a:t>
+              <a:t>Digression needed for GetProcAddress `dlsym` for all you young kids - used to dynamically build calls to external APIs / plugins. BTW the amount of calls to GetProcAddress is quite startling on a decent sized app</a:t>
             </a:r>
           </a:p>
         </p:txBody>
@@ -1663,7 +1691,7 @@
             </a:pPr>
             <a:r>
               <a:rPr lang="en"/>
-              <a:t>This is a re-imagining based upon a true story</a:t>
+              <a:t>This is a re-imagining based upon a true story; the chain of events is relatively involved which makes for a good tale</a:t>
             </a:r>
           </a:p>
         </p:txBody>
@@ -1768,7 +1796,14 @@
             </a:pPr>
             <a:r>
               <a:rPr lang="en"/>
-              <a:t>More audience participation: who expected that?</a:t>
+              <a:t>So, did anyone spot the diagram was missing some points- More audience participation: who expected that?</a:t>
+            </a:r>
+            <a:br>
+              <a:rPr lang="en"/>
+            </a:br>
+            <a:r>
+              <a:rPr lang="en"/>
+              <a:t>[BTW the misinformation is not over yet]</a:t>
             </a:r>
           </a:p>
         </p:txBody>
@@ -1877,6 +1912,36 @@
                   <a:schemeClr val="dk1"/>
                 </a:solidFill>
               </a:rPr>
+              <a:t>So we were almost there with the idea to supplant an existing function - just needed to use a different function.</a:t>
+            </a:r>
+            <a:br>
+              <a:rPr lang="en">
+                <a:solidFill>
+                  <a:schemeClr val="dk1"/>
+                </a:solidFill>
+              </a:rPr>
+            </a:br>
+            <a:r>
+              <a:rPr lang="en">
+                <a:solidFill>
+                  <a:schemeClr val="dk1"/>
+                </a:solidFill>
+              </a:rPr>
+              <a:t>Food for though - as programmers, we had a mental block against “hook everything” - would an automated tool have any such impediment?</a:t>
+            </a:r>
+            <a:br>
+              <a:rPr lang="en">
+                <a:solidFill>
+                  <a:schemeClr val="dk1"/>
+                </a:solidFill>
+              </a:rPr>
+            </a:br>
+            <a:r>
+              <a:rPr lang="en">
+                <a:solidFill>
+                  <a:schemeClr val="dk1"/>
+                </a:solidFill>
+              </a:rPr>
               <a:t>BTW the amount of calls to Get ProcAddress is quite startling on a decent sized app.</a:t>
             </a:r>
             <a:br>
@@ -1892,7 +1957,7 @@
                   <a:schemeClr val="dk1"/>
                 </a:solidFill>
               </a:rPr>
-              <a:t>More audience participation “lucky no-one uses `bind` anymore”</a:t>
+              <a:t>More audience participation “lucky no-one uses `bind` anymore”. Also “what’s a calling convention”?</a:t>
             </a:r>
           </a:p>
         </p:txBody>
@@ -1988,6 +2053,18 @@
             <a:noAutofit/>
           </a:bodyPr>
           <a:lstStyle/>
+          <a:p>
+            <a:pPr rtl="0">
+              <a:spcBef>
+                <a:spcPts val="0"/>
+              </a:spcBef>
+              <a:buNone/>
+            </a:pPr>
+            <a:r>
+              <a:rPr lang="en"/>
+              <a:t>So what’s going on here? the load order here is Process, A, B   - B is looked up dynamically!  </a:t>
+            </a:r>
+          </a:p>
           <a:p>
             <a:pPr lvl="0" rtl="0">
               <a:spcBef>
@@ -2104,6 +2181,27 @@
               <a:rPr lang="en"/>
               <a:t>It’s more about the thought provoked by identifying the (a) solution.</a:t>
             </a:r>
+            <a:br>
+              <a:rPr lang="en"/>
+            </a:br>
+            <a:r>
+              <a:rPr lang="en"/>
+              <a:t>Did anyone spot the final piece of misinformation?</a:t>
+            </a:r>
+            <a:br>
+              <a:rPr lang="en"/>
+            </a:br>
+            <a:r>
+              <a:rPr lang="en"/>
+              <a:t>It turns out A was dynamically looking up the function in B *on demand* - if it had done it at *dll load time* we would have need to have provided a shim dll via an altered search path.</a:t>
+            </a:r>
+            <a:br>
+              <a:rPr lang="en"/>
+            </a:br>
+            <a:r>
+              <a:rPr lang="en"/>
+              <a:t>In fact, there is an example of this in the code samples.</a:t>
+            </a:r>
           </a:p>
         </p:txBody>
       </p:sp>
@@ -2120,7 +2218,7 @@
   <p:cSld>
     <p:spTree>
       <p:nvGrpSpPr>
-        <p:cNvPr id="272" name="Shape 272"/>
+        <p:cNvPr id="274" name="Shape 274"/>
         <p:cNvGrpSpPr/>
         <p:nvPr/>
       </p:nvGrpSpPr>
@@ -2134,7 +2232,7 @@
       </p:grpSpPr>
       <p:sp>
         <p:nvSpPr>
-          <p:cNvPr id="273" name="Shape 273"/>
+          <p:cNvPr id="275" name="Shape 275"/>
           <p:cNvSpPr/>
           <p:nvPr>
             <p:ph idx="2" type="sldImg"/>
@@ -2178,7 +2276,7 @@
       </p:sp>
       <p:sp>
         <p:nvSpPr>
-          <p:cNvPr id="274" name="Shape 274"/>
+          <p:cNvPr id="276" name="Shape 276"/>
           <p:cNvSpPr txBox="1"/>
           <p:nvPr>
             <p:ph idx="1" type="body"/>
@@ -2199,7 +2297,7 @@
           </a:bodyPr>
           <a:lstStyle/>
           <a:p>
-            <a:pPr>
+            <a:pPr lvl="0" rtl="0">
               <a:spcBef>
                 <a:spcPts val="0"/>
               </a:spcBef>
@@ -2207,21 +2305,7 @@
             </a:pPr>
             <a:r>
               <a:rPr lang="en"/>
-              <a:t>"no, we don't use digital signatures" (could not get management to sign off on a $400 certificate while I was there and besides the 5 year old installs were not signed.</a:t>
-            </a:r>
-            <a:br>
-              <a:rPr lang="en"/>
-            </a:br>
-            <a:r>
-              <a:rPr lang="en"/>
-              <a:t>Parallel runtime? - COM servers by GUID - so hard to intercept</a:t>
-            </a:r>
-            <a:br>
-              <a:rPr lang="en"/>
-            </a:br>
-            <a:r>
-              <a:rPr lang="en"/>
-              <a:t> </a:t>
+              <a:t>So what’s going on here? the load order here is Process, B(replacement), A, at load time of A the function of B is looked up dynamically and found in the replacement</a:t>
             </a:r>
           </a:p>
         </p:txBody>
@@ -2239,7 +2323,7 @@
   <p:cSld>
     <p:spTree>
       <p:nvGrpSpPr>
-        <p:cNvPr id="278" name="Shape 278"/>
+        <p:cNvPr id="280" name="Shape 280"/>
         <p:cNvGrpSpPr/>
         <p:nvPr/>
       </p:nvGrpSpPr>
@@ -2253,7 +2337,7 @@
       </p:grpSpPr>
       <p:sp>
         <p:nvSpPr>
-          <p:cNvPr id="279" name="Shape 279"/>
+          <p:cNvPr id="281" name="Shape 281"/>
           <p:cNvSpPr/>
           <p:nvPr>
             <p:ph idx="2" type="sldImg"/>
@@ -2297,7 +2381,7 @@
       </p:sp>
       <p:sp>
         <p:nvSpPr>
-          <p:cNvPr id="280" name="Shape 280"/>
+          <p:cNvPr id="282" name="Shape 282"/>
           <p:cNvSpPr txBox="1"/>
           <p:nvPr>
             <p:ph idx="1" type="body"/>
@@ -2318,6 +2402,18 @@
           </a:bodyPr>
           <a:lstStyle/>
           <a:p>
+            <a:pPr rtl="0">
+              <a:spcBef>
+                <a:spcPts val="0"/>
+              </a:spcBef>
+              <a:buNone/>
+            </a:pPr>
+            <a:r>
+              <a:rPr lang="en"/>
+              <a:t>Thoughts on alternatives:</a:t>
+            </a:r>
+          </a:p>
+          <a:p>
             <a:pPr>
               <a:spcBef>
                 <a:spcPts val="0"/>
@@ -2325,9 +2421,23 @@
               <a:buNone/>
             </a:pPr>
             <a:r>
-              <a:t/>
+              <a:rPr lang="en"/>
+              <a:t>"no, we don't use digital signatures" (could not get management to sign off on a $400 certificate while I was there and besides the 5 year old installs were not signed.</a:t>
             </a:r>
-            <a:endParaRPr/>
+            <a:br>
+              <a:rPr lang="en"/>
+            </a:br>
+            <a:r>
+              <a:rPr lang="en"/>
+              <a:t>Parallel runtime installation? - COM servers by GUID - so hard to intercept</a:t>
+            </a:r>
+            <a:br>
+              <a:rPr lang="en"/>
+            </a:br>
+            <a:r>
+              <a:rPr lang="en"/>
+              <a:t> </a:t>
+            </a:r>
           </a:p>
         </p:txBody>
       </p:sp>
@@ -2344,7 +2454,7 @@
   <p:cSld>
     <p:spTree>
       <p:nvGrpSpPr>
-        <p:cNvPr id="284" name="Shape 284"/>
+        <p:cNvPr id="286" name="Shape 286"/>
         <p:cNvGrpSpPr/>
         <p:nvPr/>
       </p:nvGrpSpPr>
@@ -2358,7 +2468,7 @@
       </p:grpSpPr>
       <p:sp>
         <p:nvSpPr>
-          <p:cNvPr id="285" name="Shape 285"/>
+          <p:cNvPr id="287" name="Shape 287"/>
           <p:cNvSpPr/>
           <p:nvPr>
             <p:ph idx="2" type="sldImg"/>
@@ -2402,7 +2512,7 @@
       </p:sp>
       <p:sp>
         <p:nvSpPr>
-          <p:cNvPr id="286" name="Shape 286"/>
+          <p:cNvPr id="288" name="Shape 288"/>
           <p:cNvSpPr txBox="1"/>
           <p:nvPr>
             <p:ph idx="1" type="body"/>
@@ -2449,7 +2559,7 @@
   <p:cSld>
     <p:spTree>
       <p:nvGrpSpPr>
-        <p:cNvPr id="291" name="Shape 291"/>
+        <p:cNvPr id="292" name="Shape 292"/>
         <p:cNvGrpSpPr/>
         <p:nvPr/>
       </p:nvGrpSpPr>
@@ -2463,7 +2573,7 @@
       </p:grpSpPr>
       <p:sp>
         <p:nvSpPr>
-          <p:cNvPr id="292" name="Shape 292"/>
+          <p:cNvPr id="293" name="Shape 293"/>
           <p:cNvSpPr/>
           <p:nvPr>
             <p:ph idx="2" type="sldImg"/>
@@ -2507,7 +2617,112 @@
       </p:sp>
       <p:sp>
         <p:nvSpPr>
-          <p:cNvPr id="293" name="Shape 293"/>
+          <p:cNvPr id="294" name="Shape 294"/>
+          <p:cNvSpPr txBox="1"/>
+          <p:nvPr>
+            <p:ph idx="1" type="body"/>
+          </p:nvPr>
+        </p:nvSpPr>
+        <p:spPr>
+          <a:xfrm>
+            <a:off x="685800" y="4343400"/>
+            <a:ext cx="5486399" cy="4114800"/>
+          </a:xfrm>
+          <a:prstGeom prst="rect">
+            <a:avLst/>
+          </a:prstGeom>
+        </p:spPr>
+        <p:txBody>
+          <a:bodyPr anchorCtr="0" anchor="t" bIns="91425" lIns="91425" rIns="91425" tIns="91425">
+            <a:noAutofit/>
+          </a:bodyPr>
+          <a:lstStyle/>
+          <a:p>
+            <a:pPr>
+              <a:spcBef>
+                <a:spcPts val="0"/>
+              </a:spcBef>
+              <a:buNone/>
+            </a:pPr>
+            <a:r>
+              <a:t/>
+            </a:r>
+            <a:endParaRPr/>
+          </a:p>
+        </p:txBody>
+      </p:sp>
+    </p:spTree>
+  </p:cSld>
+  <p:clrMapOvr>
+    <a:masterClrMapping/>
+  </p:clrMapOvr>
+</p:notes>
+</file>
+
+<file path=ppt/notesSlides/notesSlide28.xml><?xml version="1.0" encoding="utf-8"?>
+<p:notes xmlns:a="http://schemas.openxmlformats.org/drawingml/2006/main" xmlns:r="http://schemas.openxmlformats.org/officeDocument/2006/relationships" xmlns:mc="http://schemas.openxmlformats.org/markup-compatibility/2006" xmlns:mv="urn:schemas-microsoft-com:mac:vml" xmlns:p="http://schemas.openxmlformats.org/presentationml/2006/main" xmlns:c="http://schemas.openxmlformats.org/drawingml/2006/chart" xmlns:dgm="http://schemas.openxmlformats.org/drawingml/2006/diagram" xmlns:o="urn:schemas-microsoft-com:office:office" xmlns:v="urn:schemas-microsoft-com:vml" xmlns:pvml="urn:schemas-microsoft-com:office:powerpoint" xmlns:com="http://schemas.openxmlformats.org/drawingml/2006/compatibility" xmlns:p14="http://schemas.microsoft.com/office/powerpoint/2010/main" showMasterPhAnim="0" showMasterSp="0">
+  <p:cSld>
+    <p:spTree>
+      <p:nvGrpSpPr>
+        <p:cNvPr id="299" name="Shape 299"/>
+        <p:cNvGrpSpPr/>
+        <p:nvPr/>
+      </p:nvGrpSpPr>
+      <p:grpSpPr>
+        <a:xfrm>
+          <a:off x="0" y="0"/>
+          <a:ext cx="0" cy="0"/>
+          <a:chOff x="0" y="0"/>
+          <a:chExt cx="0" cy="0"/>
+        </a:xfrm>
+      </p:grpSpPr>
+      <p:sp>
+        <p:nvSpPr>
+          <p:cNvPr id="300" name="Shape 300"/>
+          <p:cNvSpPr/>
+          <p:nvPr>
+            <p:ph idx="2" type="sldImg"/>
+          </p:nvPr>
+        </p:nvSpPr>
+        <p:spPr>
+          <a:xfrm>
+            <a:off x="381300" y="685800"/>
+            <a:ext cx="6096000" cy="3429000"/>
+          </a:xfrm>
+          <a:custGeom>
+            <a:pathLst>
+              <a:path extrusionOk="0" h="120000" w="120000">
+                <a:moveTo>
+                  <a:pt x="0" y="0"/>
+                </a:moveTo>
+                <a:lnTo>
+                  <a:pt x="120000" y="0"/>
+                </a:lnTo>
+                <a:lnTo>
+                  <a:pt x="120000" y="120000"/>
+                </a:lnTo>
+                <a:lnTo>
+                  <a:pt x="0" y="120000"/>
+                </a:lnTo>
+                <a:close/>
+              </a:path>
+            </a:pathLst>
+          </a:custGeom>
+          <a:noFill/>
+          <a:ln cap="flat" cmpd="sng" w="9525">
+            <a:solidFill>
+              <a:srgbClr val="000000"/>
+            </a:solidFill>
+            <a:prstDash val="solid"/>
+            <a:round/>
+            <a:headEnd len="med" w="med" type="none"/>
+            <a:tailEnd len="med" w="med" type="none"/>
+          </a:ln>
+        </p:spPr>
+      </p:sp>
+      <p:sp>
+        <p:nvSpPr>
+          <p:cNvPr id="301" name="Shape 301"/>
           <p:cNvSpPr txBox="1"/>
           <p:nvPr>
             <p:ph idx="1" type="body"/>
@@ -2641,7 +2856,7 @@
             </a:pPr>
             <a:r>
               <a:rPr lang="en"/>
-              <a:t>Just to set the scene - long story short: many versions out there in the wild</a:t>
+              <a:t>Just to set the scene - long story short: many versions out there in the wild and along comes the GFC</a:t>
             </a:r>
           </a:p>
         </p:txBody>
@@ -2746,7 +2961,7 @@
             </a:pPr>
             <a:r>
               <a:rPr lang="en"/>
-              <a:t>This application was in use by many customers, who were under changing regulatory requirements, mainly resulting in the need to make many.more iterations</a:t>
+              <a:t>This application was in use by many customers, who were under changing regulatory requirements, mainly resulting in the need to make many more iterations / model points</a:t>
             </a:r>
           </a:p>
         </p:txBody>
@@ -2870,7 +3085,7 @@
             </a:pPr>
             <a:r>
               <a:rPr lang="en"/>
-              <a:t>Sarbox blocked system changes for what now seems like an incredibly long lead in time</a:t>
+              <a:t>Sarbox blocked system changes for what now seems like an incredibly long lead in time and hence even a new patch / application release would cause issues</a:t>
             </a:r>
           </a:p>
         </p:txBody>
@@ -2975,7 +3190,7 @@
             </a:pPr>
             <a:r>
               <a:rPr lang="en"/>
-              <a:t>So, to get the testing tool to the end users through the normal cycle could be years. Aside: some customers had built their own home brew testing / regression / automation using the limited Object model of the provided API</a:t>
+              <a:t>So, to get the testing tool to the end users through the normal cycle could be years. Aside: some customers had indeed already built their own home brew testing / regression / automation using the limited Object Model of the provided API</a:t>
             </a:r>
           </a:p>
         </p:txBody>
@@ -3080,7 +3295,7 @@
             </a:pPr>
             <a:r>
               <a:rPr lang="en"/>
-              <a:t>So the testing tool, having grown through the noble route of a skunk works project, happened to work pretty much that way</a:t>
+              <a:t>So the testing tool, having grown through the noble route of a skunk works project, happened to work pretty much that way that was needed for the customers needing to test</a:t>
             </a:r>
           </a:p>
         </p:txBody>
@@ -3185,7 +3400,7 @@
             </a:pPr>
             <a:r>
               <a:rPr lang="en"/>
-              <a:t>The testing tool worked via accessing the API, which was thankfully quite stable but there was a security component that would block use</a:t>
+              <a:t>The testing tool worked via accessing the API, which was thankfully quite stable but there was a security component that would block use.</a:t>
             </a:r>
           </a:p>
         </p:txBody>
@@ -3289,9 +3504,9 @@
               <a:buNone/>
             </a:pPr>
             <a:r>
-              <a:t/>
+              <a:rPr lang="en"/>
+              <a:t>Windows dll loading rules and security solutions (for the time) in a nutshell. Best Security - prevent loading. Next best security - statically link. “Next best“ - load dynamically.</a:t>
             </a:r>
-            <a:endParaRPr/>
           </a:p>
         </p:txBody>
       </p:sp>
@@ -34101,7 +34316,7 @@
             </a:br>
             <a:r>
               <a:rPr lang="en" sz="2400"/>
-              <a:t>Fits all the requirements:</a:t>
+              <a:t>Fits all the requirements right?:</a:t>
             </a:r>
           </a:p>
           <a:p>
@@ -34152,7 +34367,7 @@
             </a:pPr>
             <a:r>
               <a:rPr lang="en" sz="2400"/>
-              <a:t>works with a range of version</a:t>
+              <a:t>works with a range of release versions</a:t>
             </a:r>
           </a:p>
           <a:p>
@@ -36458,6 +36673,495 @@
           </a:bodyPr>
           <a:lstStyle/>
           <a:p>
+            <a:pPr lvl="0" rtl="0">
+              <a:spcBef>
+                <a:spcPts val="0"/>
+              </a:spcBef>
+              <a:buNone/>
+            </a:pPr>
+            <a:r>
+              <a:rPr lang="en" sz="3600"/>
+              <a:t>Example: altered search path</a:t>
+            </a:r>
+          </a:p>
+        </p:txBody>
+      </p:sp>
+      <p:sp>
+        <p:nvSpPr>
+          <p:cNvPr id="271" name="Shape 271"/>
+          <p:cNvSpPr txBox="1"/>
+          <p:nvPr>
+            <p:ph idx="1" type="body"/>
+          </p:nvPr>
+        </p:nvSpPr>
+        <p:spPr>
+          <a:xfrm>
+            <a:off x="457200" y="1068679"/>
+            <a:ext cx="8229600" cy="406199"/>
+          </a:xfrm>
+          <a:prstGeom prst="rect">
+            <a:avLst/>
+          </a:prstGeom>
+        </p:spPr>
+        <p:txBody>
+          <a:bodyPr anchorCtr="0" anchor="t" bIns="91425" lIns="91425" rIns="91425" tIns="91425">
+            <a:noAutofit/>
+          </a:bodyPr>
+          <a:lstStyle/>
+          <a:p>
+            <a:pPr lvl="0" rtl="0">
+              <a:spcBef>
+                <a:spcPts val="0"/>
+              </a:spcBef>
+              <a:buNone/>
+            </a:pPr>
+            <a:r>
+              <a:rPr lang="en" sz="2400"/>
+              <a:t>https://github.com/patrickmmartin/Initrode.Hack/</a:t>
+            </a:r>
+          </a:p>
+        </p:txBody>
+      </p:sp>
+      <p:sp>
+        <p:nvSpPr>
+          <p:cNvPr id="272" name="Shape 272"/>
+          <p:cNvSpPr txBox="1"/>
+          <p:nvPr/>
+        </p:nvSpPr>
+        <p:spPr>
+          <a:xfrm>
+            <a:off x="586375" y="1878075"/>
+            <a:ext cx="6908999" cy="2405099"/>
+          </a:xfrm>
+          <a:prstGeom prst="rect">
+            <a:avLst/>
+          </a:prstGeom>
+          <a:solidFill>
+            <a:srgbClr val="000000"/>
+          </a:solidFill>
+          <a:ln>
+            <a:noFill/>
+          </a:ln>
+        </p:spPr>
+        <p:txBody>
+          <a:bodyPr anchorCtr="0" anchor="t" bIns="91425" lIns="91425" rIns="91425" tIns="91425">
+            <a:noAutofit/>
+          </a:bodyPr>
+          <a:lstStyle/>
+          <a:p>
+            <a:pPr lvl="0" rtl="0">
+              <a:spcBef>
+                <a:spcPts val="0"/>
+              </a:spcBef>
+              <a:buNone/>
+            </a:pPr>
+            <a:r>
+              <a:rPr lang="en">
+                <a:solidFill>
+                  <a:srgbClr val="B7B7B7"/>
+                </a:solidFill>
+              </a:rPr>
+              <a:t>$app_subvert2</a:t>
+            </a:r>
+          </a:p>
+          <a:p>
+            <a:pPr lvl="0" rtl="0">
+              <a:spcBef>
+                <a:spcPts val="0"/>
+              </a:spcBef>
+              <a:buClr>
+                <a:schemeClr val="dk1"/>
+              </a:buClr>
+              <a:buSzPct val="78571"/>
+              <a:buFont typeface="Arial"/>
+              <a:buNone/>
+            </a:pPr>
+            <a:r>
+              <a:rPr lang="en">
+                <a:solidFill>
+                  <a:srgbClr val="00FF00"/>
+                </a:solidFill>
+              </a:rPr>
+              <a:t>App_subvert2 start</a:t>
+            </a:r>
+          </a:p>
+          <a:p>
+            <a:pPr lvl="0" rtl="0">
+              <a:spcBef>
+                <a:spcPts val="0"/>
+              </a:spcBef>
+              <a:buClr>
+                <a:schemeClr val="dk1"/>
+              </a:buClr>
+              <a:buSzPct val="78571"/>
+              <a:buFont typeface="Arial"/>
+              <a:buNone/>
+            </a:pPr>
+            <a:r>
+              <a:rPr lang="en">
+                <a:solidFill>
+                  <a:srgbClr val="00FF00"/>
+                </a:solidFill>
+              </a:rPr>
+              <a:t>B Loaded</a:t>
+            </a:r>
+          </a:p>
+          <a:p>
+            <a:pPr lvl="0" rtl="0">
+              <a:spcBef>
+                <a:spcPts val="0"/>
+              </a:spcBef>
+              <a:buClr>
+                <a:schemeClr val="dk1"/>
+              </a:buClr>
+              <a:buSzPct val="78571"/>
+              <a:buFont typeface="Arial"/>
+              <a:buNone/>
+            </a:pPr>
+            <a:r>
+              <a:rPr lang="en">
+                <a:solidFill>
+                  <a:srgbClr val="FF0000"/>
+                </a:solidFill>
+              </a:rPr>
+              <a:t>... not really!</a:t>
+            </a:r>
+          </a:p>
+          <a:p>
+            <a:pPr lvl="0" rtl="0">
+              <a:spcBef>
+                <a:spcPts val="0"/>
+              </a:spcBef>
+              <a:buClr>
+                <a:schemeClr val="dk1"/>
+              </a:buClr>
+              <a:buSzPct val="78571"/>
+              <a:buFont typeface="Arial"/>
+              <a:buNone/>
+            </a:pPr>
+            <a:r>
+              <a:rPr lang="en">
+                <a:solidFill>
+                  <a:srgbClr val="00FF00"/>
+                </a:solidFill>
+              </a:rPr>
+              <a:t>A_tough loaded</a:t>
+            </a:r>
+          </a:p>
+          <a:p>
+            <a:pPr lvl="0" rtl="0">
+              <a:spcBef>
+                <a:spcPts val="0"/>
+              </a:spcBef>
+              <a:buClr>
+                <a:schemeClr val="dk1"/>
+              </a:buClr>
+              <a:buSzPct val="78571"/>
+              <a:buFont typeface="Arial"/>
+              <a:buNone/>
+            </a:pPr>
+            <a:r>
+              <a:rPr lang="en">
+                <a:solidFill>
+                  <a:srgbClr val="00FF00"/>
+                </a:solidFill>
+              </a:rPr>
+              <a:t>Locating SecretFunction</a:t>
+            </a:r>
+          </a:p>
+          <a:p>
+            <a:pPr lvl="0" rtl="0">
+              <a:spcBef>
+                <a:spcPts val="0"/>
+              </a:spcBef>
+              <a:buClr>
+                <a:schemeClr val="dk1"/>
+              </a:buClr>
+              <a:buSzPct val="78571"/>
+              <a:buFont typeface="Arial"/>
+              <a:buNone/>
+            </a:pPr>
+            <a:r>
+              <a:rPr lang="en">
+                <a:solidFill>
+                  <a:srgbClr val="FF0000"/>
+                </a:solidFill>
+              </a:rPr>
+              <a:t>B_.SecretFunction</a:t>
+            </a:r>
+          </a:p>
+          <a:p>
+            <a:pPr lvl="0" rtl="0">
+              <a:spcBef>
+                <a:spcPts val="0"/>
+              </a:spcBef>
+              <a:buClr>
+                <a:schemeClr val="dk1"/>
+              </a:buClr>
+              <a:buSzPct val="78571"/>
+              <a:buFont typeface="Arial"/>
+              <a:buNone/>
+            </a:pPr>
+            <a:r>
+              <a:rPr lang="en">
+                <a:solidFill>
+                  <a:srgbClr val="B7B7B7"/>
+                </a:solidFill>
+              </a:rPr>
+              <a:t>SecretFunction: 42</a:t>
+            </a:r>
+          </a:p>
+          <a:p>
+            <a:pPr lvl="0" rtl="0">
+              <a:spcBef>
+                <a:spcPts val="0"/>
+              </a:spcBef>
+              <a:buClr>
+                <a:schemeClr val="dk1"/>
+              </a:buClr>
+              <a:buFont typeface="Arial"/>
+              <a:buNone/>
+            </a:pPr>
+            <a:r>
+              <a:t/>
+            </a:r>
+            <a:endParaRPr>
+              <a:solidFill>
+                <a:srgbClr val="00FF00"/>
+              </a:solidFill>
+            </a:endParaRPr>
+          </a:p>
+          <a:p>
+            <a:pPr lvl="0" rtl="0">
+              <a:spcBef>
+                <a:spcPts val="0"/>
+              </a:spcBef>
+              <a:buClr>
+                <a:schemeClr val="dk1"/>
+              </a:buClr>
+              <a:buFont typeface="Arial"/>
+              <a:buNone/>
+            </a:pPr>
+            <a:r>
+              <a:t/>
+            </a:r>
+            <a:endParaRPr>
+              <a:solidFill>
+                <a:srgbClr val="B7B7B7"/>
+              </a:solidFill>
+            </a:endParaRPr>
+          </a:p>
+          <a:p>
+            <a:pPr lvl="0" rtl="0">
+              <a:spcBef>
+                <a:spcPts val="0"/>
+              </a:spcBef>
+              <a:buNone/>
+            </a:pPr>
+            <a:r>
+              <a:t/>
+            </a:r>
+            <a:endParaRPr>
+              <a:solidFill>
+                <a:srgbClr val="B7B7B7"/>
+              </a:solidFill>
+            </a:endParaRPr>
+          </a:p>
+          <a:p>
+            <a:pPr lvl="0" rtl="0">
+              <a:spcBef>
+                <a:spcPts val="0"/>
+              </a:spcBef>
+              <a:buNone/>
+            </a:pPr>
+            <a:r>
+              <a:t/>
+            </a:r>
+            <a:endParaRPr>
+              <a:solidFill>
+                <a:srgbClr val="B7B7B7"/>
+              </a:solidFill>
+            </a:endParaRPr>
+          </a:p>
+          <a:p>
+            <a:pPr lvl="0" rtl="0">
+              <a:spcBef>
+                <a:spcPts val="0"/>
+              </a:spcBef>
+              <a:buNone/>
+            </a:pPr>
+            <a:r>
+              <a:t/>
+            </a:r>
+            <a:endParaRPr/>
+          </a:p>
+        </p:txBody>
+      </p:sp>
+      <p:pic>
+        <p:nvPicPr>
+          <p:cNvPr id="273" name="Shape 273"/>
+          <p:cNvPicPr preferRelativeResize="0"/>
+          <p:nvPr/>
+        </p:nvPicPr>
+        <p:blipFill>
+          <a:blip r:embed="rId3">
+            <a:alphaModFix/>
+          </a:blip>
+          <a:stretch>
+            <a:fillRect/>
+          </a:stretch>
+        </p:blipFill>
+        <p:spPr>
+          <a:xfrm>
+            <a:off x="5591300" y="2213537"/>
+            <a:ext cx="3095499" cy="2516024"/>
+          </a:xfrm>
+          <a:prstGeom prst="rect">
+            <a:avLst/>
+          </a:prstGeom>
+          <a:noFill/>
+          <a:ln>
+            <a:noFill/>
+          </a:ln>
+        </p:spPr>
+      </p:pic>
+    </p:spTree>
+  </p:cSld>
+  <p:clrMapOvr>
+    <a:masterClrMapping/>
+  </p:clrMapOvr>
+  <p:transition spd="slow">
+    <p:cut/>
+  </p:transition>
+  <p:timing>
+    <p:tnLst>
+      <p:par>
+        <p:cTn dur="indefinite" nodeType="tmRoot" restart="never">
+          <p:childTnLst>
+            <p:seq concurrent="1" nextAc="seek">
+              <p:cTn dur="indefinite" id="2" nodeType="mainSeq">
+                <p:childTnLst>
+                  <p:par>
+                    <p:cTn fill="hold">
+                      <p:stCondLst>
+                        <p:cond delay="indefinite"/>
+                        <p:cond evt="onBegin" delay="0">
+                          <p:tn val="2"/>
+                        </p:cond>
+                      </p:stCondLst>
+                      <p:childTnLst>
+                        <p:par>
+                          <p:cTn fill="hold">
+                            <p:stCondLst>
+                              <p:cond delay="0"/>
+                            </p:stCondLst>
+                            <p:childTnLst>
+                              <p:par>
+                                <p:cTn fill="hold" nodeType="afterEffect" presetClass="entr" presetID="10" presetSubtype="0">
+                                  <p:stCondLst>
+                                    <p:cond delay="0"/>
+                                  </p:stCondLst>
+                                  <p:childTnLst>
+                                    <p:set>
+                                      <p:cBhvr>
+                                        <p:cTn dur="1" fill="hold">
+                                          <p:stCondLst>
+                                            <p:cond delay="0"/>
+                                          </p:stCondLst>
+                                        </p:cTn>
+                                        <p:tgtEl>
+                                          <p:spTgt spid="273"/>
+                                        </p:tgtEl>
+                                        <p:attrNameLst>
+                                          <p:attrName>style.visibility</p:attrName>
+                                        </p:attrNameLst>
+                                      </p:cBhvr>
+                                      <p:to>
+                                        <p:strVal val="visible"/>
+                                      </p:to>
+                                    </p:set>
+                                    <p:animEffect filter="fade" transition="in">
+                                      <p:cBhvr>
+                                        <p:cTn dur="1000"/>
+                                        <p:tgtEl>
+                                          <p:spTgt spid="273"/>
+                                        </p:tgtEl>
+                                      </p:cBhvr>
+                                    </p:animEffect>
+                                  </p:childTnLst>
+                                </p:cTn>
+                              </p:par>
+                            </p:childTnLst>
+                          </p:cTn>
+                        </p:par>
+                      </p:childTnLst>
+                    </p:cTn>
+                  </p:par>
+                </p:childTnLst>
+              </p:cTn>
+              <p:prevCondLst>
+                <p:cond evt="onPrev">
+                  <p:tgtEl>
+                    <p:sldTgt/>
+                  </p:tgtEl>
+                </p:cond>
+              </p:prevCondLst>
+              <p:nextCondLst>
+                <p:cond evt="onNext">
+                  <p:tgtEl>
+                    <p:sldTgt/>
+                  </p:tgtEl>
+                </p:cond>
+              </p:nextCondLst>
+            </p:seq>
+          </p:childTnLst>
+        </p:cTn>
+      </p:par>
+    </p:tnLst>
+  </p:timing>
+</p:sld>
+</file>
+
+<file path=ppt/slides/slide25.xml><?xml version="1.0" encoding="utf-8"?>
+<p:sld xmlns:a="http://schemas.openxmlformats.org/drawingml/2006/main" xmlns:r="http://schemas.openxmlformats.org/officeDocument/2006/relationships" xmlns:mc="http://schemas.openxmlformats.org/markup-compatibility/2006" xmlns:mv="urn:schemas-microsoft-com:mac:vml" xmlns:p="http://schemas.openxmlformats.org/presentationml/2006/main" xmlns:c="http://schemas.openxmlformats.org/drawingml/2006/chart" xmlns:dgm="http://schemas.openxmlformats.org/drawingml/2006/diagram" xmlns:o="urn:schemas-microsoft-com:office:office" xmlns:v="urn:schemas-microsoft-com:vml" xmlns:pvml="urn:schemas-microsoft-com:office:powerpoint" xmlns:com="http://schemas.openxmlformats.org/drawingml/2006/compatibility" xmlns:p14="http://schemas.microsoft.com/office/powerpoint/2010/main">
+  <p:cSld>
+    <p:spTree>
+      <p:nvGrpSpPr>
+        <p:cNvPr id="277" name="Shape 277"/>
+        <p:cNvGrpSpPr/>
+        <p:nvPr/>
+      </p:nvGrpSpPr>
+      <p:grpSpPr>
+        <a:xfrm>
+          <a:off x="0" y="0"/>
+          <a:ext cx="0" cy="0"/>
+          <a:chOff x="0" y="0"/>
+          <a:chExt cx="0" cy="0"/>
+        </a:xfrm>
+      </p:grpSpPr>
+      <p:sp>
+        <p:nvSpPr>
+          <p:cNvPr id="278" name="Shape 278"/>
+          <p:cNvSpPr txBox="1"/>
+          <p:nvPr>
+            <p:ph type="title"/>
+          </p:nvPr>
+        </p:nvSpPr>
+        <p:spPr>
+          <a:xfrm>
+            <a:off x="457200" y="155628"/>
+            <a:ext cx="8229600" cy="1044599"/>
+          </a:xfrm>
+          <a:prstGeom prst="rect">
+            <a:avLst/>
+          </a:prstGeom>
+        </p:spPr>
+        <p:txBody>
+          <a:bodyPr anchorCtr="0" anchor="b" bIns="91425" lIns="91425" rIns="91425" tIns="91425">
+            <a:noAutofit/>
+          </a:bodyPr>
+          <a:lstStyle/>
+          <a:p>
             <a:pPr>
               <a:spcBef>
                 <a:spcPts val="0"/>
@@ -36473,7 +37177,7 @@
       </p:sp>
       <p:sp>
         <p:nvSpPr>
-          <p:cNvPr id="271" name="Shape 271"/>
+          <p:cNvPr id="279" name="Shape 279"/>
           <p:cNvSpPr txBox="1"/>
           <p:nvPr>
             <p:ph idx="1" type="body"/>
@@ -36570,12 +37274,12 @@
 </p:sld>
 </file>
 
-<file path=ppt/slides/slide25.xml><?xml version="1.0" encoding="utf-8"?>
+<file path=ppt/slides/slide26.xml><?xml version="1.0" encoding="utf-8"?>
 <p:sld xmlns:a="http://schemas.openxmlformats.org/drawingml/2006/main" xmlns:r="http://schemas.openxmlformats.org/officeDocument/2006/relationships" xmlns:mc="http://schemas.openxmlformats.org/markup-compatibility/2006" xmlns:mv="urn:schemas-microsoft-com:mac:vml" xmlns:p="http://schemas.openxmlformats.org/presentationml/2006/main" xmlns:c="http://schemas.openxmlformats.org/drawingml/2006/chart" xmlns:dgm="http://schemas.openxmlformats.org/drawingml/2006/diagram" xmlns:o="urn:schemas-microsoft-com:office:office" xmlns:v="urn:schemas-microsoft-com:vml" xmlns:pvml="urn:schemas-microsoft-com:office:powerpoint" xmlns:com="http://schemas.openxmlformats.org/drawingml/2006/compatibility" xmlns:p14="http://schemas.microsoft.com/office/powerpoint/2010/main">
   <p:cSld>
     <p:spTree>
       <p:nvGrpSpPr>
-        <p:cNvPr id="275" name="Shape 275"/>
+        <p:cNvPr id="283" name="Shape 283"/>
         <p:cNvGrpSpPr/>
         <p:nvPr/>
       </p:nvGrpSpPr>
@@ -36589,7 +37293,7 @@
       </p:grpSpPr>
       <p:sp>
         <p:nvSpPr>
-          <p:cNvPr id="276" name="Shape 276"/>
+          <p:cNvPr id="284" name="Shape 284"/>
           <p:cNvSpPr txBox="1"/>
           <p:nvPr>
             <p:ph type="title"/>
@@ -36625,7 +37329,7 @@
       </p:sp>
       <p:sp>
         <p:nvSpPr>
-          <p:cNvPr id="277" name="Shape 277"/>
+          <p:cNvPr id="285" name="Shape 285"/>
           <p:cNvSpPr txBox="1"/>
           <p:nvPr>
             <p:ph idx="1" type="body"/>
@@ -36698,12 +37402,12 @@
 </p:sld>
 </file>
 
-<file path=ppt/slides/slide26.xml><?xml version="1.0" encoding="utf-8"?>
+<file path=ppt/slides/slide27.xml><?xml version="1.0" encoding="utf-8"?>
 <p:sld xmlns:a="http://schemas.openxmlformats.org/drawingml/2006/main" xmlns:r="http://schemas.openxmlformats.org/officeDocument/2006/relationships" xmlns:mc="http://schemas.openxmlformats.org/markup-compatibility/2006" xmlns:mv="urn:schemas-microsoft-com:mac:vml" xmlns:p="http://schemas.openxmlformats.org/presentationml/2006/main" xmlns:c="http://schemas.openxmlformats.org/drawingml/2006/chart" xmlns:dgm="http://schemas.openxmlformats.org/drawingml/2006/diagram" xmlns:o="urn:schemas-microsoft-com:office:office" xmlns:v="urn:schemas-microsoft-com:vml" xmlns:pvml="urn:schemas-microsoft-com:office:powerpoint" xmlns:com="http://schemas.openxmlformats.org/drawingml/2006/compatibility" xmlns:p14="http://schemas.microsoft.com/office/powerpoint/2010/main">
   <p:cSld>
     <p:spTree>
       <p:nvGrpSpPr>
-        <p:cNvPr id="281" name="Shape 281"/>
+        <p:cNvPr id="289" name="Shape 289"/>
         <p:cNvGrpSpPr/>
         <p:nvPr/>
       </p:nvGrpSpPr>
@@ -36717,7 +37421,7 @@
       </p:grpSpPr>
       <p:sp>
         <p:nvSpPr>
-          <p:cNvPr id="282" name="Shape 282"/>
+          <p:cNvPr id="290" name="Shape 290"/>
           <p:cNvSpPr txBox="1"/>
           <p:nvPr>
             <p:ph type="title"/>
@@ -36753,7 +37457,7 @@
       </p:sp>
       <p:sp>
         <p:nvSpPr>
-          <p:cNvPr id="283" name="Shape 283"/>
+          <p:cNvPr id="291" name="Shape 291"/>
           <p:cNvSpPr txBox="1"/>
           <p:nvPr>
             <p:ph idx="1" type="body"/>
@@ -36853,12 +37557,12 @@
 </p:sld>
 </file>
 
-<file path=ppt/slides/slide27.xml><?xml version="1.0" encoding="utf-8"?>
+<file path=ppt/slides/slide28.xml><?xml version="1.0" encoding="utf-8"?>
 <p:sld xmlns:a="http://schemas.openxmlformats.org/drawingml/2006/main" xmlns:r="http://schemas.openxmlformats.org/officeDocument/2006/relationships" xmlns:mc="http://schemas.openxmlformats.org/markup-compatibility/2006" xmlns:mv="urn:schemas-microsoft-com:mac:vml" xmlns:p="http://schemas.openxmlformats.org/presentationml/2006/main" xmlns:c="http://schemas.openxmlformats.org/drawingml/2006/chart" xmlns:dgm="http://schemas.openxmlformats.org/drawingml/2006/diagram" xmlns:o="urn:schemas-microsoft-com:office:office" xmlns:v="urn:schemas-microsoft-com:vml" xmlns:pvml="urn:schemas-microsoft-com:office:powerpoint" xmlns:com="http://schemas.openxmlformats.org/drawingml/2006/compatibility" xmlns:p14="http://schemas.microsoft.com/office/powerpoint/2010/main">
   <p:cSld>
     <p:spTree>
       <p:nvGrpSpPr>
-        <p:cNvPr id="287" name="Shape 287"/>
+        <p:cNvPr id="295" name="Shape 295"/>
         <p:cNvGrpSpPr/>
         <p:nvPr/>
       </p:nvGrpSpPr>
@@ -36872,7 +37576,7 @@
       </p:grpSpPr>
       <p:sp>
         <p:nvSpPr>
-          <p:cNvPr id="288" name="Shape 288"/>
+          <p:cNvPr id="296" name="Shape 296"/>
           <p:cNvSpPr txBox="1"/>
           <p:nvPr>
             <p:ph type="title"/>
@@ -36908,7 +37612,7 @@
       </p:sp>
       <p:sp>
         <p:nvSpPr>
-          <p:cNvPr id="289" name="Shape 289"/>
+          <p:cNvPr id="297" name="Shape 297"/>
           <p:cNvSpPr txBox="1"/>
           <p:nvPr>
             <p:ph idx="1" type="body"/>
@@ -36961,7 +37665,7 @@
       </p:sp>
       <p:sp>
         <p:nvSpPr>
-          <p:cNvPr id="290" name="Shape 290"/>
+          <p:cNvPr id="298" name="Shape 298"/>
           <p:cNvSpPr txBox="1"/>
           <p:nvPr/>
         </p:nvSpPr>
@@ -37271,7 +37975,7 @@
                                       <p:cBhvr>
                                         <p:cTn dur="2500"/>
                                         <p:tgtEl>
-                                          <p:spTgt spid="289">
+                                          <p:spTgt spid="297">
                                             <p:txEl>
                                               <p:pRg end="0" st="0"/>
                                             </p:txEl>
@@ -37287,7 +37991,7 @@
                                           </p:stCondLst>
                                         </p:cTn>
                                         <p:tgtEl>
-                                          <p:spTgt spid="289">
+                                          <p:spTgt spid="297">
                                             <p:txEl>
                                               <p:pRg end="0" st="0"/>
                                             </p:txEl>
@@ -37327,7 +38031,7 @@
                                           </p:stCondLst>
                                         </p:cTn>
                                         <p:tgtEl>
-                                          <p:spTgt spid="290">
+                                          <p:spTgt spid="298">
                                             <p:txEl>
                                               <p:pRg end="0" st="0"/>
                                             </p:txEl>
@@ -37345,7 +38049,7 @@
                                       <p:cBhvr>
                                         <p:cTn dur="1000"/>
                                         <p:tgtEl>
-                                          <p:spTgt spid="290">
+                                          <p:spTgt spid="298">
                                             <p:txEl>
                                               <p:pRg end="0" st="0"/>
                                             </p:txEl>
@@ -37379,7 +38083,7 @@
                                           </p:stCondLst>
                                         </p:cTn>
                                         <p:tgtEl>
-                                          <p:spTgt spid="290">
+                                          <p:spTgt spid="298">
                                             <p:txEl>
                                               <p:pRg end="1" st="1"/>
                                             </p:txEl>
@@ -37397,7 +38101,7 @@
                                       <p:cBhvr>
                                         <p:cTn dur="1000"/>
                                         <p:tgtEl>
-                                          <p:spTgt spid="290">
+                                          <p:spTgt spid="298">
                                             <p:txEl>
                                               <p:pRg end="1" st="1"/>
                                             </p:txEl>
@@ -37431,7 +38135,7 @@
                                           </p:stCondLst>
                                         </p:cTn>
                                         <p:tgtEl>
-                                          <p:spTgt spid="290">
+                                          <p:spTgt spid="298">
                                             <p:txEl>
                                               <p:pRg end="2" st="2"/>
                                             </p:txEl>
@@ -37449,7 +38153,7 @@
                                       <p:cBhvr>
                                         <p:cTn dur="1000"/>
                                         <p:tgtEl>
-                                          <p:spTgt spid="290">
+                                          <p:spTgt spid="298">
                                             <p:txEl>
                                               <p:pRg end="2" st="2"/>
                                             </p:txEl>
@@ -37483,7 +38187,7 @@
                                           </p:stCondLst>
                                         </p:cTn>
                                         <p:tgtEl>
-                                          <p:spTgt spid="290">
+                                          <p:spTgt spid="298">
                                             <p:txEl>
                                               <p:pRg end="3" st="3"/>
                                             </p:txEl>
@@ -37501,7 +38205,7 @@
                                       <p:cBhvr>
                                         <p:cTn dur="1000"/>
                                         <p:tgtEl>
-                                          <p:spTgt spid="290">
+                                          <p:spTgt spid="298">
                                             <p:txEl>
                                               <p:pRg end="3" st="3"/>
                                             </p:txEl>
@@ -37535,7 +38239,7 @@
                                           </p:stCondLst>
                                         </p:cTn>
                                         <p:tgtEl>
-                                          <p:spTgt spid="290">
+                                          <p:spTgt spid="298">
                                             <p:txEl>
                                               <p:pRg end="4" st="4"/>
                                             </p:txEl>
@@ -37553,7 +38257,7 @@
                                       <p:cBhvr>
                                         <p:cTn dur="1000"/>
                                         <p:tgtEl>
-                                          <p:spTgt spid="290">
+                                          <p:spTgt spid="298">
                                             <p:txEl>
                                               <p:pRg end="4" st="4"/>
                                             </p:txEl>
@@ -37587,7 +38291,7 @@
                                           </p:stCondLst>
                                         </p:cTn>
                                         <p:tgtEl>
-                                          <p:spTgt spid="290">
+                                          <p:spTgt spid="298">
                                             <p:txEl>
                                               <p:pRg end="5" st="5"/>
                                             </p:txEl>
@@ -37605,7 +38309,7 @@
                                       <p:cBhvr>
                                         <p:cTn dur="1000"/>
                                         <p:tgtEl>
-                                          <p:spTgt spid="290">
+                                          <p:spTgt spid="298">
                                             <p:txEl>
                                               <p:pRg end="5" st="5"/>
                                             </p:txEl>
@@ -37639,7 +38343,7 @@
                                           </p:stCondLst>
                                         </p:cTn>
                                         <p:tgtEl>
-                                          <p:spTgt spid="290">
+                                          <p:spTgt spid="298">
                                             <p:txEl>
                                               <p:pRg end="6" st="6"/>
                                             </p:txEl>
@@ -37657,7 +38361,7 @@
                                       <p:cBhvr>
                                         <p:cTn dur="1000"/>
                                         <p:tgtEl>
-                                          <p:spTgt spid="290">
+                                          <p:spTgt spid="298">
                                             <p:txEl>
                                               <p:pRg end="6" st="6"/>
                                             </p:txEl>
@@ -37691,7 +38395,7 @@
                                           </p:stCondLst>
                                         </p:cTn>
                                         <p:tgtEl>
-                                          <p:spTgt spid="290">
+                                          <p:spTgt spid="298">
                                             <p:txEl>
                                               <p:pRg end="7" st="7"/>
                                             </p:txEl>
@@ -37709,7 +38413,7 @@
                                       <p:cBhvr>
                                         <p:cTn dur="1000"/>
                                         <p:tgtEl>
-                                          <p:spTgt spid="290">
+                                          <p:spTgt spid="298">
                                             <p:txEl>
                                               <p:pRg end="7" st="7"/>
                                             </p:txEl>
@@ -37743,7 +38447,7 @@
                                           </p:stCondLst>
                                         </p:cTn>
                                         <p:tgtEl>
-                                          <p:spTgt spid="290">
+                                          <p:spTgt spid="298">
                                             <p:txEl>
                                               <p:pRg end="8" st="8"/>
                                             </p:txEl>
@@ -37761,7 +38465,7 @@
                                       <p:cBhvr>
                                         <p:cTn dur="1000"/>
                                         <p:tgtEl>
-                                          <p:spTgt spid="290">
+                                          <p:spTgt spid="298">
                                             <p:txEl>
                                               <p:pRg end="8" st="8"/>
                                             </p:txEl>
@@ -37795,7 +38499,7 @@
                                           </p:stCondLst>
                                         </p:cTn>
                                         <p:tgtEl>
-                                          <p:spTgt spid="290">
+                                          <p:spTgt spid="298">
                                             <p:txEl>
                                               <p:pRg end="9" st="9"/>
                                             </p:txEl>
@@ -37813,7 +38517,7 @@
                                       <p:cBhvr>
                                         <p:cTn dur="1000"/>
                                         <p:tgtEl>
-                                          <p:spTgt spid="290">
+                                          <p:spTgt spid="298">
                                             <p:txEl>
                                               <p:pRg end="9" st="9"/>
                                             </p:txEl>
@@ -37847,7 +38551,7 @@
                                           </p:stCondLst>
                                         </p:cTn>
                                         <p:tgtEl>
-                                          <p:spTgt spid="290">
+                                          <p:spTgt spid="298">
                                             <p:txEl>
                                               <p:pRg end="10" st="10"/>
                                             </p:txEl>
@@ -37865,7 +38569,7 @@
                                       <p:cBhvr>
                                         <p:cTn dur="1000"/>
                                         <p:tgtEl>
-                                          <p:spTgt spid="290">
+                                          <p:spTgt spid="298">
                                             <p:txEl>
                                               <p:pRg end="10" st="10"/>
                                             </p:txEl>
@@ -37899,7 +38603,7 @@
                                           </p:stCondLst>
                                         </p:cTn>
                                         <p:tgtEl>
-                                          <p:spTgt spid="290">
+                                          <p:spTgt spid="298">
                                             <p:txEl>
                                               <p:pRg end="11" st="11"/>
                                             </p:txEl>
@@ -37917,7 +38621,7 @@
                                       <p:cBhvr>
                                         <p:cTn dur="1000"/>
                                         <p:tgtEl>
-                                          <p:spTgt spid="290">
+                                          <p:spTgt spid="298">
                                             <p:txEl>
                                               <p:pRg end="11" st="11"/>
                                             </p:txEl>
@@ -37951,7 +38655,7 @@
                                           </p:stCondLst>
                                         </p:cTn>
                                         <p:tgtEl>
-                                          <p:spTgt spid="290">
+                                          <p:spTgt spid="298">
                                             <p:txEl>
                                               <p:pRg end="12" st="12"/>
                                             </p:txEl>
@@ -37969,7 +38673,7 @@
                                       <p:cBhvr>
                                         <p:cTn dur="1000"/>
                                         <p:tgtEl>
-                                          <p:spTgt spid="290">
+                                          <p:spTgt spid="298">
                                             <p:txEl>
                                               <p:pRg end="12" st="12"/>
                                             </p:txEl>
@@ -38003,7 +38707,7 @@
                                           </p:stCondLst>
                                         </p:cTn>
                                         <p:tgtEl>
-                                          <p:spTgt spid="290">
+                                          <p:spTgt spid="298">
                                             <p:txEl>
                                               <p:pRg end="13" st="13"/>
                                             </p:txEl>
@@ -38021,7 +38725,7 @@
                                       <p:cBhvr>
                                         <p:cTn dur="1000"/>
                                         <p:tgtEl>
-                                          <p:spTgt spid="290">
+                                          <p:spTgt spid="298">
                                             <p:txEl>
                                               <p:pRg end="13" st="13"/>
                                             </p:txEl>
@@ -38055,7 +38759,7 @@
                                           </p:stCondLst>
                                         </p:cTn>
                                         <p:tgtEl>
-                                          <p:spTgt spid="290">
+                                          <p:spTgt spid="298">
                                             <p:txEl>
                                               <p:pRg end="14" st="14"/>
                                             </p:txEl>
@@ -38073,7 +38777,7 @@
                                       <p:cBhvr>
                                         <p:cTn dur="1000"/>
                                         <p:tgtEl>
-                                          <p:spTgt spid="290">
+                                          <p:spTgt spid="298">
                                             <p:txEl>
                                               <p:pRg end="14" st="14"/>
                                             </p:txEl>
@@ -39093,7 +39797,7 @@
             </a:pPr>
             <a:r>
               <a:rPr lang="en"/>
-              <a:t>If you want to prevent you app/ binary from being run. Someone needs to return non-zero from dllmain at application startup</a:t>
+              <a:t>If you want to prevent your app/ binary from being run. Someone needs to return non-zero from dllmain at application startup</a:t>
             </a:r>
             <a:br>
               <a:rPr lang="en"/>
@@ -39124,283 +39828,6 @@
 </file>
 
 <file path=ppt/theme/theme1.xml><?xml version="1.0" encoding="utf-8"?>
-<a:theme xmlns:a="http://schemas.openxmlformats.org/drawingml/2006/main" xmlns:r="http://schemas.openxmlformats.org/officeDocument/2006/relationships" name="Custom Theme">
-  <a:themeElements>
-    <a:clrScheme name="Default">
-      <a:dk1>
-        <a:srgbClr val="000000"/>
-      </a:dk1>
-      <a:lt1>
-        <a:srgbClr val="FFFFFF"/>
-      </a:lt1>
-      <a:dk2>
-        <a:srgbClr val="158158"/>
-      </a:dk2>
-      <a:lt2>
-        <a:srgbClr val="F3F3F3"/>
-      </a:lt2>
-      <a:accent1>
-        <a:srgbClr val="058DC7"/>
-      </a:accent1>
-      <a:accent2>
-        <a:srgbClr val="50B432"/>
-      </a:accent2>
-      <a:accent3>
-        <a:srgbClr val="ED561B"/>
-      </a:accent3>
-      <a:accent4>
-        <a:srgbClr val="EDEF00"/>
-      </a:accent4>
-      <a:accent5>
-        <a:srgbClr val="24CBE5"/>
-      </a:accent5>
-      <a:accent6>
-        <a:srgbClr val="64E572"/>
-      </a:accent6>
-      <a:hlink>
-        <a:srgbClr val="2200CC"/>
-      </a:hlink>
-      <a:folHlink>
-        <a:srgbClr val="551A8B"/>
-      </a:folHlink>
-    </a:clrScheme>
-    <a:fontScheme name="Office">
-      <a:majorFont>
-        <a:latin typeface="Arial"/>
-        <a:ea typeface=""/>
-        <a:cs typeface=""/>
-        <a:font script="Jpan" typeface="ＭＳ Ｐゴシック"/>
-        <a:font script="Hang" typeface="맑은 고딕"/>
-        <a:font script="Hans" typeface="宋体"/>
-        <a:font script="Hant" typeface="新細明體"/>
-        <a:font script="Arab" typeface="Times New Roman"/>
-        <a:font script="Hebr" typeface="Times New Roman"/>
-        <a:font script="Thai" typeface="Angsana New"/>
-        <a:font script="Ethi" typeface="Nyala"/>
-        <a:font script="Beng" typeface="Vrinda"/>
-        <a:font script="Gujr" typeface="Shruti"/>
-        <a:font script="Khmr" typeface="MoolBoran"/>
-        <a:font script="Knda" typeface="Tunga"/>
-        <a:font script="Guru" typeface="Raavi"/>
-        <a:font script="Cans" typeface="Euphemia"/>
-        <a:font script="Cher" typeface="Plantagenet Cherokee"/>
-        <a:font script="Yiii" typeface="Microsoft Yi Baiti"/>
-        <a:font script="Tibt" typeface="Microsoft Himalaya"/>
-        <a:font script="Thaa" typeface="MV Boli"/>
-        <a:font script="Deva" typeface="Mangal"/>
-        <a:font script="Telu" typeface="Gautami"/>
-        <a:font script="Taml" typeface="Latha"/>
-        <a:font script="Syrc" typeface="Estrangelo Edessa"/>
-        <a:font script="Orya" typeface="Kalinga"/>
-        <a:font script="Mlym" typeface="Kartika"/>
-        <a:font script="Laoo" typeface="DokChampa"/>
-        <a:font script="Sinh" typeface="Iskoola Pota"/>
-        <a:font script="Mong" typeface="Mongolian Baiti"/>
-        <a:font script="Viet" typeface="Times New Roman"/>
-        <a:font script="Uigh" typeface="Microsoft Uighur"/>
-      </a:majorFont>
-      <a:minorFont>
-        <a:latin typeface="Arial"/>
-        <a:ea typeface=""/>
-        <a:cs typeface=""/>
-        <a:font script="Jpan" typeface="ＭＳ Ｐゴシック"/>
-        <a:font script="Hang" typeface="맑은 고딕"/>
-        <a:font script="Hans" typeface="宋体"/>
-        <a:font script="Hant" typeface="新細明體"/>
-        <a:font script="Arab" typeface="Times New Roman"/>
-        <a:font script="Hebr" typeface="Times New Roman"/>
-        <a:font script="Thai" typeface="Angsana New"/>
-        <a:font script="Ethi" typeface="Nyala"/>
-        <a:font script="Beng" typeface="Vrinda"/>
-        <a:font script="Gujr" typeface="Shruti"/>
-        <a:font script="Khmr" typeface="MoolBoran"/>
-        <a:font script="Knda" typeface="Tunga"/>
-        <a:font script="Guru" typeface="Raavi"/>
-        <a:font script="Cans" typeface="Euphemia"/>
-        <a:font script="Cher" typeface="Plantagenet Cherokee"/>
-        <a:font script="Yiii" typeface="Microsoft Yi Baiti"/>
-        <a:font script="Tibt" typeface="Microsoft Himalaya"/>
-        <a:font script="Thaa" typeface="MV Boli"/>
-        <a:font script="Deva" typeface="Mangal"/>
-        <a:font script="Telu" typeface="Gautami"/>
-        <a:font script="Taml" typeface="Latha"/>
-        <a:font script="Syrc" typeface="Estrangelo Edessa"/>
-        <a:font script="Orya" typeface="Kalinga"/>
-        <a:font script="Mlym" typeface="Kartika"/>
-        <a:font script="Laoo" typeface="DokChampa"/>
-        <a:font script="Sinh" typeface="Iskoola Pota"/>
-        <a:font script="Mong" typeface="Mongolian Baiti"/>
-        <a:font script="Viet" typeface="Times New Roman"/>
-        <a:font script="Uigh" typeface="Microsoft Uighur"/>
-      </a:minorFont>
-    </a:fontScheme>
-    <a:fmtScheme name="Office">
-      <a:fillStyleLst>
-        <a:solidFill>
-          <a:schemeClr val="phClr"/>
-        </a:solidFill>
-        <a:gradFill rotWithShape="1">
-          <a:gsLst>
-            <a:gs pos="0">
-              <a:schemeClr val="phClr">
-                <a:tint val="50000"/>
-                <a:satMod val="300000"/>
-              </a:schemeClr>
-            </a:gs>
-            <a:gs pos="35000">
-              <a:schemeClr val="phClr">
-                <a:tint val="37000"/>
-                <a:satMod val="300000"/>
-              </a:schemeClr>
-            </a:gs>
-            <a:gs pos="100000">
-              <a:schemeClr val="phClr">
-                <a:tint val="15000"/>
-                <a:satMod val="350000"/>
-              </a:schemeClr>
-            </a:gs>
-          </a:gsLst>
-          <a:lin ang="16200000" scaled="1"/>
-        </a:gradFill>
-        <a:gradFill rotWithShape="1">
-          <a:gsLst>
-            <a:gs pos="0">
-              <a:schemeClr val="phClr">
-                <a:tint val="100000"/>
-                <a:shade val="100000"/>
-                <a:satMod val="130000"/>
-              </a:schemeClr>
-            </a:gs>
-            <a:gs pos="100000">
-              <a:schemeClr val="phClr">
-                <a:tint val="50000"/>
-                <a:shade val="100000"/>
-                <a:satMod val="350000"/>
-              </a:schemeClr>
-            </a:gs>
-          </a:gsLst>
-          <a:lin ang="16200000" scaled="0"/>
-        </a:gradFill>
-      </a:fillStyleLst>
-      <a:lnStyleLst>
-        <a:ln cap="flat" cmpd="sng" w="9525" algn="ctr">
-          <a:solidFill>
-            <a:schemeClr val="phClr">
-              <a:shade val="95000"/>
-              <a:satMod val="105000"/>
-            </a:schemeClr>
-          </a:solidFill>
-          <a:prstDash val="solid"/>
-        </a:ln>
-        <a:ln cap="flat" cmpd="sng" w="25400" algn="ctr">
-          <a:solidFill>
-            <a:schemeClr val="phClr"/>
-          </a:solidFill>
-          <a:prstDash val="solid"/>
-        </a:ln>
-        <a:ln cap="flat" cmpd="sng" w="38100" algn="ctr">
-          <a:solidFill>
-            <a:schemeClr val="phClr"/>
-          </a:solidFill>
-          <a:prstDash val="solid"/>
-        </a:ln>
-      </a:lnStyleLst>
-      <a:effectStyleLst>
-        <a:effectStyle>
-          <a:effectLst>
-            <a:outerShdw blurRad="40000" rotWithShape="0" dir="5400000" dist="20000">
-              <a:srgbClr val="000000">
-                <a:alpha val="38000"/>
-              </a:srgbClr>
-            </a:outerShdw>
-          </a:effectLst>
-        </a:effectStyle>
-        <a:effectStyle>
-          <a:effectLst>
-            <a:outerShdw blurRad="40000" rotWithShape="0" dir="5400000" dist="23000">
-              <a:srgbClr val="000000">
-                <a:alpha val="35000"/>
-              </a:srgbClr>
-            </a:outerShdw>
-          </a:effectLst>
-        </a:effectStyle>
-        <a:effectStyle>
-          <a:effectLst>
-            <a:outerShdw blurRad="40000" rotWithShape="0" dir="5400000" dist="23000">
-              <a:srgbClr val="000000">
-                <a:alpha val="35000"/>
-              </a:srgbClr>
-            </a:outerShdw>
-          </a:effectLst>
-          <a:scene3d>
-            <a:camera prst="orthographicFront">
-              <a:rot lat="0" lon="0" rev="0"/>
-            </a:camera>
-            <a:lightRig dir="t" rig="threePt">
-              <a:rot lat="0" lon="0" rev="1200000"/>
-            </a:lightRig>
-          </a:scene3d>
-          <a:sp3d>
-            <a:bevelT h="25400" w="63500"/>
-          </a:sp3d>
-        </a:effectStyle>
-      </a:effectStyleLst>
-      <a:bgFillStyleLst>
-        <a:solidFill>
-          <a:schemeClr val="phClr"/>
-        </a:solidFill>
-        <a:gradFill rotWithShape="1">
-          <a:gsLst>
-            <a:gs pos="0">
-              <a:schemeClr val="phClr">
-                <a:tint val="40000"/>
-                <a:satMod val="350000"/>
-              </a:schemeClr>
-            </a:gs>
-            <a:gs pos="40000">
-              <a:schemeClr val="phClr">
-                <a:tint val="45000"/>
-                <a:shade val="99000"/>
-                <a:satMod val="350000"/>
-              </a:schemeClr>
-            </a:gs>
-            <a:gs pos="100000">
-              <a:schemeClr val="phClr">
-                <a:shade val="20000"/>
-                <a:satMod val="255000"/>
-              </a:schemeClr>
-            </a:gs>
-          </a:gsLst>
-          <a:path path="circle">
-            <a:fillToRect b="180000" l="50000" r="50000" t="-80000"/>
-          </a:path>
-        </a:gradFill>
-        <a:gradFill rotWithShape="1">
-          <a:gsLst>
-            <a:gs pos="0">
-              <a:schemeClr val="phClr">
-                <a:tint val="80000"/>
-                <a:satMod val="300000"/>
-              </a:schemeClr>
-            </a:gs>
-            <a:gs pos="100000">
-              <a:schemeClr val="phClr">
-                <a:shade val="30000"/>
-                <a:satMod val="200000"/>
-              </a:schemeClr>
-            </a:gs>
-          </a:gsLst>
-          <a:path path="circle">
-            <a:fillToRect b="50000" l="50000" r="50000" t="50000"/>
-          </a:path>
-        </a:gradFill>
-      </a:bgFillStyleLst>
-    </a:fmtScheme>
-  </a:themeElements>
-</a:theme>
-</file>
-
-<file path=ppt/theme/theme2.xml><?xml version="1.0" encoding="utf-8"?>
 <a:theme xmlns:a="http://schemas.openxmlformats.org/drawingml/2006/main" xmlns:r="http://schemas.openxmlformats.org/officeDocument/2006/relationships" name="Office Theme">
   <a:themeElements>
     <a:clrScheme name="Office">
@@ -39717,6 +40144,283 @@
 </a:theme>
 </file>
 
+<file path=ppt/theme/theme2.xml><?xml version="1.0" encoding="utf-8"?>
+<a:theme xmlns:a="http://schemas.openxmlformats.org/drawingml/2006/main" xmlns:r="http://schemas.openxmlformats.org/officeDocument/2006/relationships" name="Custom Theme">
+  <a:themeElements>
+    <a:clrScheme name="Default">
+      <a:dk1>
+        <a:srgbClr val="000000"/>
+      </a:dk1>
+      <a:lt1>
+        <a:srgbClr val="FFFFFF"/>
+      </a:lt1>
+      <a:dk2>
+        <a:srgbClr val="158158"/>
+      </a:dk2>
+      <a:lt2>
+        <a:srgbClr val="F3F3F3"/>
+      </a:lt2>
+      <a:accent1>
+        <a:srgbClr val="058DC7"/>
+      </a:accent1>
+      <a:accent2>
+        <a:srgbClr val="50B432"/>
+      </a:accent2>
+      <a:accent3>
+        <a:srgbClr val="ED561B"/>
+      </a:accent3>
+      <a:accent4>
+        <a:srgbClr val="EDEF00"/>
+      </a:accent4>
+      <a:accent5>
+        <a:srgbClr val="24CBE5"/>
+      </a:accent5>
+      <a:accent6>
+        <a:srgbClr val="64E572"/>
+      </a:accent6>
+      <a:hlink>
+        <a:srgbClr val="2200CC"/>
+      </a:hlink>
+      <a:folHlink>
+        <a:srgbClr val="551A8B"/>
+      </a:folHlink>
+    </a:clrScheme>
+    <a:fontScheme name="Office">
+      <a:majorFont>
+        <a:latin typeface="Arial"/>
+        <a:ea typeface=""/>
+        <a:cs typeface=""/>
+        <a:font script="Jpan" typeface="ＭＳ Ｐゴシック"/>
+        <a:font script="Hang" typeface="맑은 고딕"/>
+        <a:font script="Hans" typeface="宋体"/>
+        <a:font script="Hant" typeface="新細明體"/>
+        <a:font script="Arab" typeface="Times New Roman"/>
+        <a:font script="Hebr" typeface="Times New Roman"/>
+        <a:font script="Thai" typeface="Angsana New"/>
+        <a:font script="Ethi" typeface="Nyala"/>
+        <a:font script="Beng" typeface="Vrinda"/>
+        <a:font script="Gujr" typeface="Shruti"/>
+        <a:font script="Khmr" typeface="MoolBoran"/>
+        <a:font script="Knda" typeface="Tunga"/>
+        <a:font script="Guru" typeface="Raavi"/>
+        <a:font script="Cans" typeface="Euphemia"/>
+        <a:font script="Cher" typeface="Plantagenet Cherokee"/>
+        <a:font script="Yiii" typeface="Microsoft Yi Baiti"/>
+        <a:font script="Tibt" typeface="Microsoft Himalaya"/>
+        <a:font script="Thaa" typeface="MV Boli"/>
+        <a:font script="Deva" typeface="Mangal"/>
+        <a:font script="Telu" typeface="Gautami"/>
+        <a:font script="Taml" typeface="Latha"/>
+        <a:font script="Syrc" typeface="Estrangelo Edessa"/>
+        <a:font script="Orya" typeface="Kalinga"/>
+        <a:font script="Mlym" typeface="Kartika"/>
+        <a:font script="Laoo" typeface="DokChampa"/>
+        <a:font script="Sinh" typeface="Iskoola Pota"/>
+        <a:font script="Mong" typeface="Mongolian Baiti"/>
+        <a:font script="Viet" typeface="Times New Roman"/>
+        <a:font script="Uigh" typeface="Microsoft Uighur"/>
+      </a:majorFont>
+      <a:minorFont>
+        <a:latin typeface="Arial"/>
+        <a:ea typeface=""/>
+        <a:cs typeface=""/>
+        <a:font script="Jpan" typeface="ＭＳ Ｐゴシック"/>
+        <a:font script="Hang" typeface="맑은 고딕"/>
+        <a:font script="Hans" typeface="宋体"/>
+        <a:font script="Hant" typeface="新細明體"/>
+        <a:font script="Arab" typeface="Times New Roman"/>
+        <a:font script="Hebr" typeface="Times New Roman"/>
+        <a:font script="Thai" typeface="Angsana New"/>
+        <a:font script="Ethi" typeface="Nyala"/>
+        <a:font script="Beng" typeface="Vrinda"/>
+        <a:font script="Gujr" typeface="Shruti"/>
+        <a:font script="Khmr" typeface="MoolBoran"/>
+        <a:font script="Knda" typeface="Tunga"/>
+        <a:font script="Guru" typeface="Raavi"/>
+        <a:font script="Cans" typeface="Euphemia"/>
+        <a:font script="Cher" typeface="Plantagenet Cherokee"/>
+        <a:font script="Yiii" typeface="Microsoft Yi Baiti"/>
+        <a:font script="Tibt" typeface="Microsoft Himalaya"/>
+        <a:font script="Thaa" typeface="MV Boli"/>
+        <a:font script="Deva" typeface="Mangal"/>
+        <a:font script="Telu" typeface="Gautami"/>
+        <a:font script="Taml" typeface="Latha"/>
+        <a:font script="Syrc" typeface="Estrangelo Edessa"/>
+        <a:font script="Orya" typeface="Kalinga"/>
+        <a:font script="Mlym" typeface="Kartika"/>
+        <a:font script="Laoo" typeface="DokChampa"/>
+        <a:font script="Sinh" typeface="Iskoola Pota"/>
+        <a:font script="Mong" typeface="Mongolian Baiti"/>
+        <a:font script="Viet" typeface="Times New Roman"/>
+        <a:font script="Uigh" typeface="Microsoft Uighur"/>
+      </a:minorFont>
+    </a:fontScheme>
+    <a:fmtScheme name="Office">
+      <a:fillStyleLst>
+        <a:solidFill>
+          <a:schemeClr val="phClr"/>
+        </a:solidFill>
+        <a:gradFill rotWithShape="1">
+          <a:gsLst>
+            <a:gs pos="0">
+              <a:schemeClr val="phClr">
+                <a:tint val="50000"/>
+                <a:satMod val="300000"/>
+              </a:schemeClr>
+            </a:gs>
+            <a:gs pos="35000">
+              <a:schemeClr val="phClr">
+                <a:tint val="37000"/>
+                <a:satMod val="300000"/>
+              </a:schemeClr>
+            </a:gs>
+            <a:gs pos="100000">
+              <a:schemeClr val="phClr">
+                <a:tint val="15000"/>
+                <a:satMod val="350000"/>
+              </a:schemeClr>
+            </a:gs>
+          </a:gsLst>
+          <a:lin ang="16200000" scaled="1"/>
+        </a:gradFill>
+        <a:gradFill rotWithShape="1">
+          <a:gsLst>
+            <a:gs pos="0">
+              <a:schemeClr val="phClr">
+                <a:tint val="100000"/>
+                <a:shade val="100000"/>
+                <a:satMod val="130000"/>
+              </a:schemeClr>
+            </a:gs>
+            <a:gs pos="100000">
+              <a:schemeClr val="phClr">
+                <a:tint val="50000"/>
+                <a:shade val="100000"/>
+                <a:satMod val="350000"/>
+              </a:schemeClr>
+            </a:gs>
+          </a:gsLst>
+          <a:lin ang="16200000" scaled="0"/>
+        </a:gradFill>
+      </a:fillStyleLst>
+      <a:lnStyleLst>
+        <a:ln cap="flat" cmpd="sng" w="9525" algn="ctr">
+          <a:solidFill>
+            <a:schemeClr val="phClr">
+              <a:shade val="95000"/>
+              <a:satMod val="105000"/>
+            </a:schemeClr>
+          </a:solidFill>
+          <a:prstDash val="solid"/>
+        </a:ln>
+        <a:ln cap="flat" cmpd="sng" w="25400" algn="ctr">
+          <a:solidFill>
+            <a:schemeClr val="phClr"/>
+          </a:solidFill>
+          <a:prstDash val="solid"/>
+        </a:ln>
+        <a:ln cap="flat" cmpd="sng" w="38100" algn="ctr">
+          <a:solidFill>
+            <a:schemeClr val="phClr"/>
+          </a:solidFill>
+          <a:prstDash val="solid"/>
+        </a:ln>
+      </a:lnStyleLst>
+      <a:effectStyleLst>
+        <a:effectStyle>
+          <a:effectLst>
+            <a:outerShdw blurRad="40000" rotWithShape="0" dir="5400000" dist="20000">
+              <a:srgbClr val="000000">
+                <a:alpha val="38000"/>
+              </a:srgbClr>
+            </a:outerShdw>
+          </a:effectLst>
+        </a:effectStyle>
+        <a:effectStyle>
+          <a:effectLst>
+            <a:outerShdw blurRad="40000" rotWithShape="0" dir="5400000" dist="23000">
+              <a:srgbClr val="000000">
+                <a:alpha val="35000"/>
+              </a:srgbClr>
+            </a:outerShdw>
+          </a:effectLst>
+        </a:effectStyle>
+        <a:effectStyle>
+          <a:effectLst>
+            <a:outerShdw blurRad="40000" rotWithShape="0" dir="5400000" dist="23000">
+              <a:srgbClr val="000000">
+                <a:alpha val="35000"/>
+              </a:srgbClr>
+            </a:outerShdw>
+          </a:effectLst>
+          <a:scene3d>
+            <a:camera prst="orthographicFront">
+              <a:rot lat="0" lon="0" rev="0"/>
+            </a:camera>
+            <a:lightRig dir="t" rig="threePt">
+              <a:rot lat="0" lon="0" rev="1200000"/>
+            </a:lightRig>
+          </a:scene3d>
+          <a:sp3d>
+            <a:bevelT h="25400" w="63500"/>
+          </a:sp3d>
+        </a:effectStyle>
+      </a:effectStyleLst>
+      <a:bgFillStyleLst>
+        <a:solidFill>
+          <a:schemeClr val="phClr"/>
+        </a:solidFill>
+        <a:gradFill rotWithShape="1">
+          <a:gsLst>
+            <a:gs pos="0">
+              <a:schemeClr val="phClr">
+                <a:tint val="40000"/>
+                <a:satMod val="350000"/>
+              </a:schemeClr>
+            </a:gs>
+            <a:gs pos="40000">
+              <a:schemeClr val="phClr">
+                <a:tint val="45000"/>
+                <a:shade val="99000"/>
+                <a:satMod val="350000"/>
+              </a:schemeClr>
+            </a:gs>
+            <a:gs pos="100000">
+              <a:schemeClr val="phClr">
+                <a:shade val="20000"/>
+                <a:satMod val="255000"/>
+              </a:schemeClr>
+            </a:gs>
+          </a:gsLst>
+          <a:path path="circle">
+            <a:fillToRect b="180000" l="50000" r="50000" t="-80000"/>
+          </a:path>
+        </a:gradFill>
+        <a:gradFill rotWithShape="1">
+          <a:gsLst>
+            <a:gs pos="0">
+              <a:schemeClr val="phClr">
+                <a:tint val="80000"/>
+                <a:satMod val="300000"/>
+              </a:schemeClr>
+            </a:gs>
+            <a:gs pos="100000">
+              <a:schemeClr val="phClr">
+                <a:shade val="30000"/>
+                <a:satMod val="200000"/>
+              </a:schemeClr>
+            </a:gs>
+          </a:gsLst>
+          <a:path path="circle">
+            <a:fillToRect b="50000" l="50000" r="50000" t="50000"/>
+          </a:path>
+        </a:gradFill>
+      </a:bgFillStyleLst>
+    </a:fmtScheme>
+  </a:themeElements>
+</a:theme>
+</file>
+
 <file path=ppt/theme/theme3.xml><?xml version="1.0" encoding="utf-8"?>
 <a:theme xmlns:a="http://schemas.openxmlformats.org/drawingml/2006/main" xmlns:r="http://schemas.openxmlformats.org/officeDocument/2006/relationships" name="sketched">
   <a:themeElements>

</xml_diff>